<commit_message>
outline update for course content, added final exam study guide
</commit_message>
<xml_diff>
--- a/slides/09_imensionality_reduction.pptx
+++ b/slides/09_imensionality_reduction.pptx
@@ -232,7 +232,7 @@
           <a:p>
             <a:fld id="{67BBBCD2-ACC1-994A-B916-9CCF0CF45AA7}" type="datetimeFigureOut">
               <a:rPr lang="en-US" smtClean="0"/>
-              <a:t>8/16/18</a:t>
+              <a:t>11/1/18</a:t>
             </a:fld>
             <a:endParaRPr lang="en-US"/>
           </a:p>
@@ -762,7 +762,7 @@
           <a:p>
             <a:fld id="{5A51E4C7-F726-5340-BE62-EFD5B98E383E}" type="datetimeFigureOut">
               <a:rPr lang="en-US" smtClean="0"/>
-              <a:t>8/16/18</a:t>
+              <a:t>11/1/18</a:t>
             </a:fld>
             <a:endParaRPr lang="en-US"/>
           </a:p>
@@ -960,7 +960,7 @@
           <a:p>
             <a:fld id="{5A51E4C7-F726-5340-BE62-EFD5B98E383E}" type="datetimeFigureOut">
               <a:rPr lang="en-US" smtClean="0"/>
-              <a:t>8/16/18</a:t>
+              <a:t>11/1/18</a:t>
             </a:fld>
             <a:endParaRPr lang="en-US"/>
           </a:p>
@@ -1138,7 +1138,7 @@
           <a:p>
             <a:fld id="{5A51E4C7-F726-5340-BE62-EFD5B98E383E}" type="datetimeFigureOut">
               <a:rPr lang="en-US" smtClean="0"/>
-              <a:t>8/16/18</a:t>
+              <a:t>11/1/18</a:t>
             </a:fld>
             <a:endParaRPr lang="en-US"/>
           </a:p>
@@ -1306,7 +1306,7 @@
           <a:p>
             <a:fld id="{5A51E4C7-F726-5340-BE62-EFD5B98E383E}" type="datetimeFigureOut">
               <a:rPr lang="en-US" smtClean="0"/>
-              <a:t>8/16/18</a:t>
+              <a:t>11/1/18</a:t>
             </a:fld>
             <a:endParaRPr lang="en-US"/>
           </a:p>
@@ -1551,7 +1551,7 @@
           <a:p>
             <a:fld id="{5A51E4C7-F726-5340-BE62-EFD5B98E383E}" type="datetimeFigureOut">
               <a:rPr lang="en-US" smtClean="0"/>
-              <a:t>8/16/18</a:t>
+              <a:t>11/1/18</a:t>
             </a:fld>
             <a:endParaRPr lang="en-US"/>
           </a:p>
@@ -1836,7 +1836,7 @@
           <a:p>
             <a:fld id="{5A51E4C7-F726-5340-BE62-EFD5B98E383E}" type="datetimeFigureOut">
               <a:rPr lang="en-US" smtClean="0"/>
-              <a:t>8/16/18</a:t>
+              <a:t>11/1/18</a:t>
             </a:fld>
             <a:endParaRPr lang="en-US"/>
           </a:p>
@@ -2255,7 +2255,7 @@
           <a:p>
             <a:fld id="{5A51E4C7-F726-5340-BE62-EFD5B98E383E}" type="datetimeFigureOut">
               <a:rPr lang="en-US" smtClean="0"/>
-              <a:t>8/16/18</a:t>
+              <a:t>11/1/18</a:t>
             </a:fld>
             <a:endParaRPr lang="en-US"/>
           </a:p>
@@ -2372,7 +2372,7 @@
           <a:p>
             <a:fld id="{5A51E4C7-F726-5340-BE62-EFD5B98E383E}" type="datetimeFigureOut">
               <a:rPr lang="en-US" smtClean="0"/>
-              <a:t>8/16/18</a:t>
+              <a:t>11/1/18</a:t>
             </a:fld>
             <a:endParaRPr lang="en-US"/>
           </a:p>
@@ -2467,7 +2467,7 @@
           <a:p>
             <a:fld id="{5A51E4C7-F726-5340-BE62-EFD5B98E383E}" type="datetimeFigureOut">
               <a:rPr lang="en-US" smtClean="0"/>
-              <a:t>8/16/18</a:t>
+              <a:t>11/1/18</a:t>
             </a:fld>
             <a:endParaRPr lang="en-US"/>
           </a:p>
@@ -2742,7 +2742,7 @@
           <a:p>
             <a:fld id="{5A51E4C7-F726-5340-BE62-EFD5B98E383E}" type="datetimeFigureOut">
               <a:rPr lang="en-US" smtClean="0"/>
-              <a:t>8/16/18</a:t>
+              <a:t>11/1/18</a:t>
             </a:fld>
             <a:endParaRPr lang="en-US"/>
           </a:p>
@@ -2994,7 +2994,7 @@
           <a:p>
             <a:fld id="{5A51E4C7-F726-5340-BE62-EFD5B98E383E}" type="datetimeFigureOut">
               <a:rPr lang="en-US" smtClean="0"/>
-              <a:t>8/16/18</a:t>
+              <a:t>11/1/18</a:t>
             </a:fld>
             <a:endParaRPr lang="en-US"/>
           </a:p>
@@ -3205,7 +3205,7 @@
           <a:p>
             <a:fld id="{5A51E4C7-F726-5340-BE62-EFD5B98E383E}" type="datetimeFigureOut">
               <a:rPr lang="en-US" smtClean="0"/>
-              <a:t>8/16/18</a:t>
+              <a:t>11/1/18</a:t>
             </a:fld>
             <a:endParaRPr lang="en-US"/>
           </a:p>
@@ -4323,7 +4323,7 @@
             </a:r>
             <a:r>
               <a:rPr lang="en-US" sz="2400" dirty="0"/>
-              <a:t>defines a direction in p-dimensional feature space along which the data vary the most.</a:t>
+              <a:t>defines a direction in p-dimensional feature space along which the data that vary the most.</a:t>
             </a:r>
           </a:p>
           <a:p>
@@ -4930,7 +4930,12 @@
             <p:ph idx="1"/>
           </p:nvPr>
         </p:nvSpPr>
-        <p:spPr/>
+        <p:spPr>
+          <a:xfrm>
+            <a:off x="457200" y="1600200"/>
+            <a:ext cx="8343900" cy="4525963"/>
+          </a:xfrm>
+        </p:spPr>
         <p:txBody>
           <a:bodyPr>
             <a:normAutofit/>
@@ -5463,7 +5468,7 @@
             <a:pPr lvl="1"/>
             <a:r>
               <a:rPr lang="en-US" sz="2400" dirty="0"/>
-              <a:t>Principal components analysis, a tool used for data visualization or data pre-processing before supervised techniques are applied.</a:t>
+              <a:t>Principal components analysis, a tool used for data visualization or data pre-processing before supervised or unsupervised techniques are applied.</a:t>
             </a:r>
           </a:p>
         </p:txBody>
@@ -5564,7 +5569,7 @@
             </a:r>
             <a:r>
               <a:rPr lang="en-US" sz="2400" dirty="0"/>
-              <a:t> observations (using average squared Euclidean distance as a measure of closeness)</a:t>
+              <a:t> observations (using average squared Euclidean distance as a measure of closeness).</a:t>
             </a:r>
           </a:p>
           <a:p>
@@ -6158,37 +6163,39 @@
           <a:lstStyle/>
           <a:p>
             <a:r>
-              <a:rPr lang="en-US" sz="2600" dirty="0"/>
+              <a:rPr lang="en-US" sz="2400" dirty="0"/>
               <a:t>If we use principal components as a summary of our data, how many components are sufficient? </a:t>
             </a:r>
-            <a:endParaRPr lang="en-US" sz="2600" dirty="0">
+            <a:endParaRPr lang="en-US" sz="2400" dirty="0">
               <a:effectLst/>
             </a:endParaRPr>
           </a:p>
           <a:p>
-            <a:r>
-              <a:rPr lang="en-US" sz="2600" dirty="0"/>
+            <a:pPr lvl="1"/>
+            <a:r>
+              <a:rPr lang="en-US" sz="2400" dirty="0"/>
               <a:t>No simple answer to this question, as cross-validation is not available for this purpose. </a:t>
             </a:r>
-            <a:endParaRPr lang="en-US" sz="2600" dirty="0">
+            <a:endParaRPr lang="en-US" sz="2400" dirty="0">
               <a:effectLst/>
             </a:endParaRPr>
           </a:p>
           <a:p>
             <a:r>
-              <a:rPr lang="en-US" sz="2600" dirty="0"/>
+              <a:rPr lang="en-US" sz="2400" dirty="0"/>
               <a:t>When could we use cross-validation to select the number of components? </a:t>
             </a:r>
-            <a:endParaRPr lang="en-US" sz="2600" dirty="0">
+            <a:endParaRPr lang="en-US" sz="2400" dirty="0">
               <a:effectLst/>
             </a:endParaRPr>
           </a:p>
           <a:p>
-            <a:r>
-              <a:rPr lang="en-US" sz="2600" dirty="0"/>
+            <a:pPr lvl="1"/>
+            <a:r>
+              <a:rPr lang="en-US" sz="2400" dirty="0"/>
               <a:t>Proportion of variance explained: look for an “elbow”. </a:t>
             </a:r>
-            <a:endParaRPr lang="en-US" sz="2600" dirty="0">
+            <a:endParaRPr lang="en-US" sz="2400" dirty="0">
               <a:effectLst/>
             </a:endParaRPr>
           </a:p>
@@ -6581,7 +6588,7 @@
           <a:p>
             <a:r>
               <a:rPr lang="en-US" sz="2400" dirty="0"/>
-              <a:t>Apart from producing derived variables for use in supervised learning problems, PCA also serves as a tool for data visualization.</a:t>
+              <a:t>Apart from producing derived variables for use in supervised learning problems, PCA also serves as a tool for clustering and data visualization.</a:t>
             </a:r>
           </a:p>
         </p:txBody>

</xml_diff>